<commit_message>
uPDATED second HT lecture
</commit_message>
<xml_diff>
--- a/modules/Hypothesis_Testing/PPT-Lecture-2.pptx
+++ b/modules/Hypothesis_Testing/PPT-Lecture-2.pptx
@@ -610,6 +610,105 @@
     </a:lvl9pPr>
   </p:notesStyle>
 </p:notesMaster>
+</file>
+
+<file path=ppt/notesSlides/notesSlide1.xml><?xml version="1.0" encoding="utf-8"?>
+<p:notes xmlns:a="http://schemas.openxmlformats.org/drawingml/2006/main" xmlns:r="http://schemas.openxmlformats.org/officeDocument/2006/relationships" xmlns:p="http://schemas.openxmlformats.org/presentationml/2006/main">
+  <p:cSld>
+    <p:spTree>
+      <p:nvGrpSpPr>
+        <p:cNvPr id="1" name=""/>
+        <p:cNvGrpSpPr/>
+        <p:nvPr/>
+      </p:nvGrpSpPr>
+      <p:grpSpPr>
+        <a:xfrm>
+          <a:off x="0" y="0"/>
+          <a:ext cx="0" cy="0"/>
+          <a:chOff x="0" y="0"/>
+          <a:chExt cx="0" cy="0"/>
+        </a:xfrm>
+      </p:grpSpPr>
+      <p:sp>
+        <p:nvSpPr>
+          <p:cNvPr id="2" name="Slide Image Placeholder 1"/>
+          <p:cNvSpPr>
+            <a:spLocks noGrp="1" noRot="1" noChangeAspect="1"/>
+          </p:cNvSpPr>
+          <p:nvPr>
+            <p:ph type="sldImg"/>
+          </p:nvPr>
+        </p:nvSpPr>
+        <p:spPr/>
+      </p:sp>
+      <p:sp>
+        <p:nvSpPr>
+          <p:cNvPr id="3" name="Notes Placeholder 2"/>
+          <p:cNvSpPr>
+            <a:spLocks noGrp="1"/>
+          </p:cNvSpPr>
+          <p:nvPr>
+            <p:ph type="body" idx="1"/>
+          </p:nvPr>
+        </p:nvSpPr>
+        <p:spPr/>
+        <p:txBody>
+          <a:bodyPr/>
+          <a:lstStyle/>
+          <a:p>
+            <a:r>
+              <a:rPr lang="en-US" dirty="0" smtClean="0"/>
+              <a:t>Ha</a:t>
+            </a:r>
+            <a:r>
+              <a:rPr lang="en-US" baseline="0" dirty="0" smtClean="0"/>
+              <a:t> mu&lt;100, sigma-10,n=30,alpha=0.05</a:t>
+            </a:r>
+          </a:p>
+          <a:p>
+            <a:r>
+              <a:rPr lang="en-US" baseline="0" dirty="0" smtClean="0"/>
+              <a:t>True mu=95</a:t>
+            </a:r>
+            <a:endParaRPr lang="en-US" dirty="0"/>
+          </a:p>
+        </p:txBody>
+      </p:sp>
+      <p:sp>
+        <p:nvSpPr>
+          <p:cNvPr id="4" name="Slide Number Placeholder 3"/>
+          <p:cNvSpPr>
+            <a:spLocks noGrp="1"/>
+          </p:cNvSpPr>
+          <p:nvPr>
+            <p:ph type="sldNum" sz="quarter" idx="10"/>
+          </p:nvPr>
+        </p:nvSpPr>
+        <p:spPr/>
+        <p:txBody>
+          <a:bodyPr/>
+          <a:lstStyle/>
+          <a:p>
+            <a:fld id="{0106E419-36E1-4A95-9EA8-F3AB4DA9478A}" type="slidenum">
+              <a:rPr lang="en-US" smtClean="0"/>
+              <a:pPr/>
+              <a:t>6</a:t>
+            </a:fld>
+            <a:endParaRPr lang="en-US"/>
+          </a:p>
+        </p:txBody>
+      </p:sp>
+    </p:spTree>
+    <p:extLst>
+      <p:ext uri="{BB962C8B-B14F-4D97-AF65-F5344CB8AC3E}">
+        <p14:creationId xmlns:p14="http://schemas.microsoft.com/office/powerpoint/2010/main" val="1032568412"/>
+      </p:ext>
+    </p:extLst>
+  </p:cSld>
+  <p:clrMapOvr>
+    <a:masterClrMapping/>
+  </p:clrMapOvr>
+</p:notes>
 </file>
 
 <file path=ppt/slideLayouts/slideLayout1.xml><?xml version="1.0" encoding="utf-8"?>
@@ -5145,7 +5244,7 @@
         <p:spPr>
           <a:xfrm>
             <a:off x="597265" y="2133600"/>
-            <a:ext cx="4493538" cy="400110"/>
+            <a:ext cx="6186309" cy="400110"/>
           </a:xfrm>
           <a:prstGeom prst="rect">
             <a:avLst/>
@@ -5176,7 +5275,47 @@
                 <a:latin typeface="Courier New" pitchFamily="49" charset="0"/>
                 <a:cs typeface="Courier New" pitchFamily="49" charset="0"/>
               </a:rPr>
-              <a:t>(135.9,mean=137,sd=1)</a:t>
+              <a:t>(135.9,mean=137,sd=10/</a:t>
+            </a:r>
+            <a:r>
+              <a:rPr lang="en-US" sz="2000" dirty="0" err="1" smtClean="0">
+                <a:solidFill>
+                  <a:srgbClr val="0070C0"/>
+                </a:solidFill>
+                <a:latin typeface="Courier New" pitchFamily="49" charset="0"/>
+                <a:cs typeface="Courier New" pitchFamily="49" charset="0"/>
+              </a:rPr>
+              <a:t>sqr</a:t>
+            </a:r>
+            <a:r>
+              <a:rPr lang="en-US" sz="2000" dirty="0" err="1" smtClean="0">
+                <a:solidFill>
+                  <a:srgbClr val="0070C0"/>
+                </a:solidFill>
+                <a:latin typeface="Courier New" pitchFamily="49" charset="0"/>
+                <a:cs typeface="Courier New" pitchFamily="49" charset="0"/>
+              </a:rPr>
+              <a:t>t</a:t>
+            </a:r>
+            <a:r>
+              <a:rPr lang="en-US" sz="2000" dirty="0" smtClean="0">
+                <a:solidFill>
+                  <a:srgbClr val="0070C0"/>
+                </a:solidFill>
+                <a:latin typeface="Courier New" pitchFamily="49" charset="0"/>
+                <a:cs typeface="Courier New" pitchFamily="49" charset="0"/>
+              </a:rPr>
+              <a:t>(100)</a:t>
+            </a:r>
+            <a:r>
+              <a:rPr lang="en-US" sz="2000" dirty="0" smtClean="0">
+                <a:solidFill>
+                  <a:srgbClr val="0070C0"/>
+                </a:solidFill>
+                <a:latin typeface="Courier New" pitchFamily="49" charset="0"/>
+                <a:cs typeface="Courier New" pitchFamily="49" charset="0"/>
+              </a:rPr>
+              <a:t>)</a:t>
             </a:r>
             <a:endParaRPr lang="en-US" sz="2000" dirty="0">
               <a:solidFill>
@@ -5197,7 +5336,7 @@
         <p:spPr>
           <a:xfrm>
             <a:off x="593574" y="3172146"/>
-            <a:ext cx="4801314" cy="400110"/>
+            <a:ext cx="6494085" cy="400110"/>
           </a:xfrm>
           <a:prstGeom prst="rect">
             <a:avLst/>
@@ -5211,7 +5350,7 @@
           <a:lstStyle/>
           <a:p>
             <a:r>
-              <a:rPr lang="en-US" sz="2000" dirty="0" err="1" smtClean="0">
+              <a:rPr lang="en-US" sz="2000" dirty="0" err="1">
                 <a:solidFill>
                   <a:srgbClr val="0070C0"/>
                 </a:solidFill>
@@ -5221,14 +5360,34 @@
               <a:t>distrib</a:t>
             </a:r>
             <a:r>
-              <a:rPr lang="en-US" sz="2000" dirty="0" smtClean="0">
+              <a:rPr lang="en-US" sz="2000" dirty="0">
                 <a:solidFill>
                   <a:srgbClr val="0070C0"/>
                 </a:solidFill>
                 <a:latin typeface="Courier New" pitchFamily="49" charset="0"/>
                 <a:cs typeface="Courier New" pitchFamily="49" charset="0"/>
               </a:rPr>
-              <a:t>(135.9,mean=137.1,sd=1)</a:t>
+              <a:t>(135.9,mean=137.1,sd=10/</a:t>
+            </a:r>
+            <a:r>
+              <a:rPr lang="en-US" sz="2000" dirty="0" err="1">
+                <a:solidFill>
+                  <a:srgbClr val="0070C0"/>
+                </a:solidFill>
+                <a:latin typeface="Courier New" pitchFamily="49" charset="0"/>
+                <a:cs typeface="Courier New" pitchFamily="49" charset="0"/>
+              </a:rPr>
+              <a:t>sqrt</a:t>
+            </a:r>
+            <a:r>
+              <a:rPr lang="en-US" sz="2000" dirty="0">
+                <a:solidFill>
+                  <a:srgbClr val="0070C0"/>
+                </a:solidFill>
+                <a:latin typeface="Courier New" pitchFamily="49" charset="0"/>
+                <a:cs typeface="Courier New" pitchFamily="49" charset="0"/>
+              </a:rPr>
+              <a:t>(100))</a:t>
             </a:r>
             <a:endParaRPr lang="en-US" sz="2000" dirty="0">
               <a:solidFill>
@@ -5249,7 +5408,7 @@
         <p:spPr>
           <a:xfrm>
             <a:off x="591312" y="4181856"/>
-            <a:ext cx="4801314" cy="400110"/>
+            <a:ext cx="6494085" cy="400110"/>
           </a:xfrm>
           <a:prstGeom prst="rect">
             <a:avLst/>
@@ -5263,7 +5422,7 @@
           <a:lstStyle/>
           <a:p>
             <a:r>
-              <a:rPr lang="en-US" sz="2000" dirty="0" err="1" smtClean="0">
+              <a:rPr lang="en-US" sz="2000" dirty="0" err="1">
                 <a:solidFill>
                   <a:srgbClr val="0070C0"/>
                 </a:solidFill>
@@ -5273,14 +5432,34 @@
               <a:t>distrib</a:t>
             </a:r>
             <a:r>
-              <a:rPr lang="en-US" sz="2000" dirty="0" smtClean="0">
+              <a:rPr lang="en-US" sz="2000" dirty="0">
                 <a:solidFill>
                   <a:srgbClr val="0070C0"/>
                 </a:solidFill>
                 <a:latin typeface="Courier New" pitchFamily="49" charset="0"/>
                 <a:cs typeface="Courier New" pitchFamily="49" charset="0"/>
               </a:rPr>
-              <a:t>(135.9,mean=137.2,sd=1)</a:t>
+              <a:t>(135.9,mean=137.2,sd=10/</a:t>
+            </a:r>
+            <a:r>
+              <a:rPr lang="en-US" sz="2000" dirty="0" err="1">
+                <a:solidFill>
+                  <a:srgbClr val="0070C0"/>
+                </a:solidFill>
+                <a:latin typeface="Courier New" pitchFamily="49" charset="0"/>
+                <a:cs typeface="Courier New" pitchFamily="49" charset="0"/>
+              </a:rPr>
+              <a:t>sqrt</a:t>
+            </a:r>
+            <a:r>
+              <a:rPr lang="en-US" sz="2000" dirty="0">
+                <a:solidFill>
+                  <a:srgbClr val="0070C0"/>
+                </a:solidFill>
+                <a:latin typeface="Courier New" pitchFamily="49" charset="0"/>
+                <a:cs typeface="Courier New" pitchFamily="49" charset="0"/>
+              </a:rPr>
+              <a:t>(100))</a:t>
             </a:r>
             <a:endParaRPr lang="en-US" sz="2000" dirty="0">
               <a:solidFill>
@@ -5301,7 +5480,7 @@
         <p:spPr>
           <a:xfrm>
             <a:off x="591312" y="5229546"/>
-            <a:ext cx="4801314" cy="400110"/>
+            <a:ext cx="6494085" cy="400110"/>
           </a:xfrm>
           <a:prstGeom prst="rect">
             <a:avLst/>
@@ -5315,7 +5494,7 @@
           <a:lstStyle/>
           <a:p>
             <a:r>
-              <a:rPr lang="en-US" sz="2000" dirty="0" err="1" smtClean="0">
+              <a:rPr lang="en-US" sz="2000" dirty="0" err="1">
                 <a:solidFill>
                   <a:srgbClr val="0070C0"/>
                 </a:solidFill>
@@ -5325,14 +5504,34 @@
               <a:t>distrib</a:t>
             </a:r>
             <a:r>
-              <a:rPr lang="en-US" sz="2000" dirty="0" smtClean="0">
+              <a:rPr lang="en-US" sz="2000" dirty="0">
                 <a:solidFill>
                   <a:srgbClr val="0070C0"/>
                 </a:solidFill>
                 <a:latin typeface="Courier New" pitchFamily="49" charset="0"/>
                 <a:cs typeface="Courier New" pitchFamily="49" charset="0"/>
               </a:rPr>
-              <a:t>(135.9,mean=137.3,sd=1)</a:t>
+              <a:t>(135.9,mean=137.3,sd=10/</a:t>
+            </a:r>
+            <a:r>
+              <a:rPr lang="en-US" sz="2000" dirty="0" err="1">
+                <a:solidFill>
+                  <a:srgbClr val="0070C0"/>
+                </a:solidFill>
+                <a:latin typeface="Courier New" pitchFamily="49" charset="0"/>
+                <a:cs typeface="Courier New" pitchFamily="49" charset="0"/>
+              </a:rPr>
+              <a:t>sqrt</a:t>
+            </a:r>
+            <a:r>
+              <a:rPr lang="en-US" sz="2000" dirty="0">
+                <a:solidFill>
+                  <a:srgbClr val="0070C0"/>
+                </a:solidFill>
+                <a:latin typeface="Courier New" pitchFamily="49" charset="0"/>
+                <a:cs typeface="Courier New" pitchFamily="49" charset="0"/>
+              </a:rPr>
+              <a:t>(100))</a:t>
             </a:r>
             <a:endParaRPr lang="en-US" sz="2000" dirty="0">
               <a:solidFill>
@@ -20425,7 +20624,7 @@
           <a:graphicData uri="http://schemas.openxmlformats.org/presentationml/2006/ole">
             <mc:AlternateContent xmlns:mc="http://schemas.openxmlformats.org/markup-compatibility/2006">
               <mc:Choice xmlns:v="urn:schemas-microsoft-com:vml" Requires="v">
-                <p:oleObj spid="_x0000_s207912" name="Equation" r:id="rId3" imgW="126720" imgH="152280" progId="Equation.3">
+                <p:oleObj spid="_x0000_s207913" name="Equation" r:id="rId3" imgW="126720" imgH="152280" progId="Equation.3">
                   <p:embed/>
                 </p:oleObj>
               </mc:Choice>
@@ -20670,12 +20869,12 @@
           <a:graphicData uri="http://schemas.openxmlformats.org/presentationml/2006/ole">
             <mc:AlternateContent xmlns:mc="http://schemas.openxmlformats.org/markup-compatibility/2006">
               <mc:Choice xmlns:v="urn:schemas-microsoft-com:vml" Requires="v">
-                <p:oleObj spid="_x0000_s193598" name="Document" r:id="rId4" imgW="6367320" imgH="4113360" progId="Word.Document.8">
+                <p:oleObj spid="_x0000_s193599" name="Document" r:id="rId5" imgW="6367320" imgH="4113360" progId="Word.Document.8">
                   <p:embed/>
                 </p:oleObj>
               </mc:Choice>
               <mc:Fallback>
-                <p:oleObj name="Document" r:id="rId4" imgW="6367320" imgH="4113360" progId="Word.Document.8">
+                <p:oleObj name="Document" r:id="rId5" imgW="6367320" imgH="4113360" progId="Word.Document.8">
                   <p:embed/>
                   <p:pic>
                     <p:nvPicPr>
@@ -20686,7 +20885,7 @@
                       <p:nvPr/>
                     </p:nvPicPr>
                     <p:blipFill>
-                      <a:blip r:embed="rId5">
+                      <a:blip r:embed="rId6">
                         <a:extLst>
                           <a:ext uri="{28A0092B-C50C-407E-A947-70E740481C1C}">
                             <a14:useLocalDpi xmlns:a14="http://schemas.microsoft.com/office/drawing/2010/main" val="0"/>
@@ -21847,7 +22046,7 @@
 </file>
 
 <file path=ppt/slides/slide7.xml><?xml version="1.0" encoding="utf-8"?>
-<p:sld xmlns:a="http://schemas.openxmlformats.org/drawingml/2006/main" xmlns:r="http://schemas.openxmlformats.org/officeDocument/2006/relationships" xmlns:p="http://schemas.openxmlformats.org/presentationml/2006/main" showMasterPhAnim="0">
+<p:sld xmlns:a="http://schemas.openxmlformats.org/drawingml/2006/main" xmlns:r="http://schemas.openxmlformats.org/officeDocument/2006/relationships" xmlns:p="http://schemas.openxmlformats.org/presentationml/2006/main" showMasterPhAnim="0" show="0">
   <p:cSld>
     <p:spTree>
       <p:nvGrpSpPr>
@@ -22065,6 +22264,14 @@
   <p:clrMapOvr>
     <a:masterClrMapping/>
   </p:clrMapOvr>
+  <mc:AlternateContent xmlns:mc="http://schemas.openxmlformats.org/markup-compatibility/2006">
+    <mc:Choice xmlns:p14="http://schemas.microsoft.com/office/powerpoint/2010/main" Requires="p14">
+      <p:transition spd="slow" p14:dur="2000"/>
+    </mc:Choice>
+    <mc:Fallback>
+      <p:transition spd="slow"/>
+    </mc:Fallback>
+  </mc:AlternateContent>
   <p:timing>
     <p:tnLst>
       <p:par>

</xml_diff>